<commit_message>
Update Presentation 1 Team 6.pptx
</commit_message>
<xml_diff>
--- a/Documents/Presentation 1 Team 6.pptx
+++ b/Documents/Presentation 1 Team 6.pptx
@@ -11,10 +11,10 @@
     <p:sldId id="257" r:id="rId2"/>
     <p:sldId id="258" r:id="rId3"/>
     <p:sldId id="260" r:id="rId4"/>
-    <p:sldId id="263" r:id="rId5"/>
-    <p:sldId id="262" r:id="rId6"/>
-    <p:sldId id="274" r:id="rId7"/>
-    <p:sldId id="275" r:id="rId8"/>
+    <p:sldId id="279" r:id="rId5"/>
+    <p:sldId id="263" r:id="rId6"/>
+    <p:sldId id="262" r:id="rId7"/>
+    <p:sldId id="274" r:id="rId8"/>
     <p:sldId id="276" r:id="rId9"/>
     <p:sldId id="261" r:id="rId10"/>
     <p:sldId id="277" r:id="rId11"/>
@@ -207,7 +207,7 @@
           <a:p>
             <a:fld id="{DF513D69-9E9D-42CB-BE0B-7ECD4BDD3B2D}" type="datetimeFigureOut">
               <a:rPr lang="en-US" smtClean="0"/>
-              <a:t>1/27/2020</a:t>
+              <a:t>1/28/2020</a:t>
             </a:fld>
             <a:endParaRPr lang="en-US"/>
           </a:p>
@@ -712,7 +712,7 @@
           <a:p>
             <a:fld id="{4E48520E-32C8-4414-890C-7CBC08B2294A}" type="datetime1">
               <a:rPr lang="en-US" smtClean="0"/>
-              <a:t>1/27/2020</a:t>
+              <a:t>1/28/2020</a:t>
             </a:fld>
             <a:endParaRPr lang="en-US" dirty="0"/>
           </a:p>
@@ -915,7 +915,7 @@
           <a:p>
             <a:fld id="{9C60EE0B-D3E7-4BA9-96EB-B79C65888E2C}" type="datetime1">
               <a:rPr lang="en-US" smtClean="0"/>
-              <a:t>1/27/2020</a:t>
+              <a:t>1/28/2020</a:t>
             </a:fld>
             <a:endParaRPr lang="en-US" dirty="0"/>
           </a:p>
@@ -1277,7 +1277,7 @@
           <a:p>
             <a:fld id="{FE7E9CAD-1E0A-478F-BEE2-8128617CC520}" type="datetime1">
               <a:rPr lang="en-US" smtClean="0"/>
-              <a:t>1/27/2020</a:t>
+              <a:t>1/28/2020</a:t>
             </a:fld>
             <a:endParaRPr lang="en-US" dirty="0"/>
           </a:p>
@@ -1475,7 +1475,7 @@
           <a:p>
             <a:fld id="{A4007744-2B17-4BD5-845E-7599A045CF96}" type="datetime1">
               <a:rPr lang="en-US" smtClean="0"/>
-              <a:t>1/27/2020</a:t>
+              <a:t>1/28/2020</a:t>
             </a:fld>
             <a:endParaRPr lang="en-US" dirty="0"/>
           </a:p>
@@ -1787,7 +1787,7 @@
           <a:p>
             <a:fld id="{27C8EF47-871E-4678-879D-A90C14B2DA0C}" type="datetime1">
               <a:rPr lang="en-US" smtClean="0"/>
-              <a:t>1/27/2020</a:t>
+              <a:t>1/28/2020</a:t>
             </a:fld>
             <a:endParaRPr lang="en-US" dirty="0"/>
           </a:p>
@@ -2040,7 +2040,7 @@
           <a:p>
             <a:fld id="{7D9ACD6B-F655-4557-B4D1-0CB9FF4F92DA}" type="datetime1">
               <a:rPr lang="en-US" smtClean="0"/>
-              <a:t>1/27/2020</a:t>
+              <a:t>1/28/2020</a:t>
             </a:fld>
             <a:endParaRPr lang="en-US" dirty="0"/>
           </a:p>
@@ -2462,7 +2462,7 @@
           <a:p>
             <a:fld id="{887B29D5-C63A-4848-A66E-970B009B21D6}" type="datetime1">
               <a:rPr lang="en-US" smtClean="0"/>
-              <a:t>1/27/2020</a:t>
+              <a:t>1/28/2020</a:t>
             </a:fld>
             <a:endParaRPr lang="en-US" dirty="0"/>
           </a:p>
@@ -2585,7 +2585,7 @@
           <a:p>
             <a:fld id="{D1071F5E-9350-40A3-A2A0-70E5C8829D36}" type="datetime1">
               <a:rPr lang="en-US" smtClean="0"/>
-              <a:t>1/27/2020</a:t>
+              <a:t>1/28/2020</a:t>
             </a:fld>
             <a:endParaRPr lang="en-US" dirty="0"/>
           </a:p>
@@ -2680,7 +2680,7 @@
           <a:p>
             <a:fld id="{8E927C05-A324-4AB8-A0D3-D435E116E1CC}" type="datetime1">
               <a:rPr lang="en-US" smtClean="0"/>
-              <a:t>1/27/2020</a:t>
+              <a:t>1/28/2020</a:t>
             </a:fld>
             <a:endParaRPr lang="en-US" dirty="0"/>
           </a:p>
@@ -3057,7 +3057,7 @@
           <a:p>
             <a:fld id="{E1D3FB0E-4CAF-489E-8C4A-485F13723096}" type="datetime1">
               <a:rPr lang="en-US" smtClean="0"/>
-              <a:t>1/27/2020</a:t>
+              <a:t>1/28/2020</a:t>
             </a:fld>
             <a:endParaRPr lang="en-US" dirty="0"/>
           </a:p>
@@ -3350,7 +3350,7 @@
           <a:p>
             <a:fld id="{893E041F-481A-404D-810C-E24FE859FCF4}" type="datetime1">
               <a:rPr lang="en-US" smtClean="0"/>
-              <a:t>1/27/2020</a:t>
+              <a:t>1/28/2020</a:t>
             </a:fld>
             <a:endParaRPr lang="en-US" dirty="0"/>
           </a:p>
@@ -3565,7 +3565,7 @@
           <a:p>
             <a:fld id="{5055098C-D6FA-4101-A6D7-809A3A56FE01}" type="datetime1">
               <a:rPr lang="en-US" smtClean="0"/>
-              <a:t>1/27/2020</a:t>
+              <a:t>1/28/2020</a:t>
             </a:fld>
             <a:endParaRPr lang="en-US" dirty="0"/>
           </a:p>
@@ -4585,7 +4585,7 @@
           <a:p>
             <a:fld id="{D6EF5160-096B-47B6-A4A9-A8FF9261181D}" type="datetime1">
               <a:rPr lang="en-US" smtClean="0"/>
-              <a:t>1/27/2020</a:t>
+              <a:t>1/28/2020</a:t>
             </a:fld>
             <a:endParaRPr lang="en-US" dirty="0"/>
           </a:p>
@@ -4714,7 +4714,7 @@
           <a:p>
             <a:fld id="{D6EF5160-096B-47B6-A4A9-A8FF9261181D}" type="datetime1">
               <a:rPr lang="en-US" smtClean="0"/>
-              <a:t>1/27/2020</a:t>
+              <a:t>1/28/2020</a:t>
             </a:fld>
             <a:endParaRPr lang="en-US" dirty="0"/>
           </a:p>
@@ -6180,7 +6180,7 @@
           <a:p>
             <a:fld id="{BA522519-8E4D-4ED0-887A-78E3C0BBA207}" type="datetime1">
               <a:rPr lang="en-US" smtClean="0"/>
-              <a:t>1/27/2020</a:t>
+              <a:t>1/28/2020</a:t>
             </a:fld>
             <a:endParaRPr lang="en-US" dirty="0"/>
           </a:p>
@@ -6239,7 +6239,7 @@
           <a:p>
             <a:fld id="{BE5B7605-F2C1-40AD-9D0E-739FB234A1E4}" type="datetime1">
               <a:rPr lang="en-US" smtClean="0"/>
-              <a:t>1/27/2020</a:t>
+              <a:t>1/28/2020</a:t>
             </a:fld>
             <a:endParaRPr lang="en-US" dirty="0"/>
           </a:p>
@@ -6427,7 +6427,7 @@
           <a:p>
             <a:fld id="{D6EF5160-096B-47B6-A4A9-A8FF9261181D}" type="datetime1">
               <a:rPr lang="en-US" smtClean="0"/>
-              <a:t>1/27/2020</a:t>
+              <a:t>1/28/2020</a:t>
             </a:fld>
             <a:endParaRPr lang="en-US" dirty="0"/>
           </a:p>
@@ -6463,7 +6463,7 @@
           <a:p>
             <a:r>
               <a:rPr lang="en-US" sz="4000" dirty="0"/>
-              <a:t>Testing Approach</a:t>
+              <a:t>Team Structure</a:t>
             </a:r>
           </a:p>
         </p:txBody>
@@ -6482,8 +6482,8 @@
         </p:nvSpPr>
         <p:spPr>
           <a:xfrm>
-            <a:off x="570451" y="1295963"/>
-            <a:ext cx="2114026" cy="461665"/>
+            <a:off x="360727" y="1987071"/>
+            <a:ext cx="10880521" cy="2677656"/>
           </a:xfrm>
           <a:prstGeom prst="rect">
             <a:avLst/>
@@ -6498,7 +6498,204 @@
           <a:p>
             <a:r>
               <a:rPr lang="en-US" sz="2400" dirty="0"/>
-              <a:t>Lorem Ipsum</a:t>
+              <a:t>Team 6 will be using an Agile – Like system for development</a:t>
+            </a:r>
+          </a:p>
+          <a:p>
+            <a:endParaRPr lang="en-US" sz="2400" dirty="0"/>
+          </a:p>
+          <a:p>
+            <a:r>
+              <a:rPr lang="en-US" sz="2400" dirty="0"/>
+              <a:t>Setup:</a:t>
+            </a:r>
+          </a:p>
+          <a:p>
+            <a:pPr marL="342900" indent="-342900">
+              <a:buFont typeface="Arial" panose="020B0604020202020204" pitchFamily="34" charset="0"/>
+              <a:buChar char="•"/>
+            </a:pPr>
+            <a:r>
+              <a:rPr lang="en-US" sz="2400" dirty="0"/>
+              <a:t>Sprint length will be 2 week sections</a:t>
+            </a:r>
+          </a:p>
+          <a:p>
+            <a:pPr marL="342900" indent="-342900">
+              <a:buFont typeface="Arial" panose="020B0604020202020204" pitchFamily="34" charset="0"/>
+              <a:buChar char="•"/>
+            </a:pPr>
+            <a:r>
+              <a:rPr lang="en-US" sz="2400" dirty="0"/>
+              <a:t>Total development time will be 16 weeks</a:t>
+            </a:r>
+          </a:p>
+          <a:p>
+            <a:pPr marL="342900" indent="-342900">
+              <a:buFont typeface="Arial" panose="020B0604020202020204" pitchFamily="34" charset="0"/>
+              <a:buChar char="•"/>
+            </a:pPr>
+            <a:r>
+              <a:rPr lang="en-US" sz="2400" dirty="0"/>
+              <a:t>Meetings are to occur at every sprint start or when needed</a:t>
+            </a:r>
+          </a:p>
+          <a:p>
+            <a:pPr marL="342900" indent="-342900">
+              <a:buFont typeface="Arial" panose="020B0604020202020204" pitchFamily="34" charset="0"/>
+              <a:buChar char="•"/>
+            </a:pPr>
+            <a:r>
+              <a:rPr lang="en-US" sz="2400" dirty="0"/>
+              <a:t>System stability is of key concern, so focus on that will be key to meeting agenda</a:t>
+            </a:r>
+          </a:p>
+        </p:txBody>
+      </p:sp>
+    </p:spTree>
+    <p:extLst>
+      <p:ext uri="{BB962C8B-B14F-4D97-AF65-F5344CB8AC3E}">
+        <p14:creationId xmlns:p14="http://schemas.microsoft.com/office/powerpoint/2010/main" val="795566764"/>
+      </p:ext>
+    </p:extLst>
+  </p:cSld>
+  <p:clrMapOvr>
+    <a:masterClrMapping/>
+  </p:clrMapOvr>
+</p:sld>
+</file>
+
+<file path=ppt/slides/slide5.xml><?xml version="1.0" encoding="utf-8"?>
+<p:sld xmlns:a="http://schemas.openxmlformats.org/drawingml/2006/main" xmlns:r="http://schemas.openxmlformats.org/officeDocument/2006/relationships" xmlns:p="http://schemas.openxmlformats.org/presentationml/2006/main">
+  <p:cSld>
+    <p:spTree>
+      <p:nvGrpSpPr>
+        <p:cNvPr id="1" name=""/>
+        <p:cNvGrpSpPr/>
+        <p:nvPr/>
+      </p:nvGrpSpPr>
+      <p:grpSpPr>
+        <a:xfrm>
+          <a:off x="0" y="0"/>
+          <a:ext cx="0" cy="0"/>
+          <a:chOff x="0" y="0"/>
+          <a:chExt cx="0" cy="0"/>
+        </a:xfrm>
+      </p:grpSpPr>
+      <p:sp>
+        <p:nvSpPr>
+          <p:cNvPr id="2" name="Date Placeholder 1">
+            <a:extLst>
+              <a:ext uri="{FF2B5EF4-FFF2-40B4-BE49-F238E27FC236}">
+                <a16:creationId xmlns:a16="http://schemas.microsoft.com/office/drawing/2014/main" id="{CB864E48-37A9-47B1-935F-168939B5AA15}"/>
+              </a:ext>
+            </a:extLst>
+          </p:cNvPr>
+          <p:cNvSpPr>
+            <a:spLocks noGrp="1"/>
+          </p:cNvSpPr>
+          <p:nvPr>
+            <p:ph type="dt" sz="half" idx="10"/>
+          </p:nvPr>
+        </p:nvSpPr>
+        <p:spPr/>
+        <p:txBody>
+          <a:bodyPr/>
+          <a:lstStyle/>
+          <a:p>
+            <a:fld id="{D6EF5160-096B-47B6-A4A9-A8FF9261181D}" type="datetime1">
+              <a:rPr lang="en-US" smtClean="0"/>
+              <a:t>1/28/2020</a:t>
+            </a:fld>
+            <a:endParaRPr lang="en-US" dirty="0"/>
+          </a:p>
+        </p:txBody>
+      </p:sp>
+      <p:sp>
+        <p:nvSpPr>
+          <p:cNvPr id="3" name="TextBox 2">
+            <a:extLst>
+              <a:ext uri="{FF2B5EF4-FFF2-40B4-BE49-F238E27FC236}">
+                <a16:creationId xmlns:a16="http://schemas.microsoft.com/office/drawing/2014/main" id="{1890E273-70AF-4AB2-928C-D79B606322A3}"/>
+              </a:ext>
+            </a:extLst>
+          </p:cNvPr>
+          <p:cNvSpPr txBox="1"/>
+          <p:nvPr/>
+        </p:nvSpPr>
+        <p:spPr>
+          <a:xfrm>
+            <a:off x="360727" y="443012"/>
+            <a:ext cx="6887361" cy="707886"/>
+          </a:xfrm>
+          <a:prstGeom prst="rect">
+            <a:avLst/>
+          </a:prstGeom>
+          <a:noFill/>
+        </p:spPr>
+        <p:txBody>
+          <a:bodyPr wrap="square" rtlCol="0">
+            <a:spAutoFit/>
+          </a:bodyPr>
+          <a:lstStyle/>
+          <a:p>
+            <a:r>
+              <a:rPr lang="en-US" sz="4000" dirty="0"/>
+              <a:t>Testing Approach / Test Levels</a:t>
+            </a:r>
+          </a:p>
+        </p:txBody>
+      </p:sp>
+      <p:sp>
+        <p:nvSpPr>
+          <p:cNvPr id="4" name="TextBox 3">
+            <a:extLst>
+              <a:ext uri="{FF2B5EF4-FFF2-40B4-BE49-F238E27FC236}">
+                <a16:creationId xmlns:a16="http://schemas.microsoft.com/office/drawing/2014/main" id="{E0D60709-584D-4E35-85DB-111373A28C44}"/>
+              </a:ext>
+            </a:extLst>
+          </p:cNvPr>
+          <p:cNvSpPr txBox="1"/>
+          <p:nvPr/>
+        </p:nvSpPr>
+        <p:spPr>
+          <a:xfrm>
+            <a:off x="588627" y="1738051"/>
+            <a:ext cx="11014745" cy="3046988"/>
+          </a:xfrm>
+          <a:prstGeom prst="rect">
+            <a:avLst/>
+          </a:prstGeom>
+          <a:noFill/>
+        </p:spPr>
+        <p:txBody>
+          <a:bodyPr wrap="square" rtlCol="0">
+            <a:spAutoFit/>
+          </a:bodyPr>
+          <a:lstStyle/>
+          <a:p>
+            <a:r>
+              <a:rPr lang="en-US" sz="2400" dirty="0"/>
+              <a:t>Progress through the Project will be monitored by a “Ring System”</a:t>
+            </a:r>
+            <a:br>
+              <a:rPr lang="en-US" sz="2400" dirty="0"/>
+            </a:br>
+            <a:br>
+              <a:rPr lang="en-US" sz="2400" dirty="0"/>
+            </a:br>
+            <a:r>
+              <a:rPr lang="en-US" sz="2400" dirty="0"/>
+              <a:t>The Ring system will be where testing will either prove a pass or fail, and if there are no major issues, and less than 2 minor issues, then the program goes into the next ring segment. </a:t>
+            </a:r>
+          </a:p>
+          <a:p>
+            <a:endParaRPr lang="en-US" sz="2400" dirty="0"/>
+          </a:p>
+          <a:p>
+            <a:r>
+              <a:rPr lang="en-US" sz="2400" dirty="0"/>
+              <a:t>There are 4 “rings” we will be working through, Alpha, Beta, Post Production, and Release</a:t>
             </a:r>
           </a:p>
         </p:txBody>
@@ -6516,7 +6713,7 @@
 </p:sld>
 </file>
 
-<file path=ppt/slides/slide5.xml><?xml version="1.0" encoding="utf-8"?>
+<file path=ppt/slides/slide6.xml><?xml version="1.0" encoding="utf-8"?>
 <p:sld xmlns:a="http://schemas.openxmlformats.org/drawingml/2006/main" xmlns:r="http://schemas.openxmlformats.org/officeDocument/2006/relationships" xmlns:p="http://schemas.openxmlformats.org/presentationml/2006/main">
   <p:cSld>
     <p:spTree>
@@ -6556,7 +6753,7 @@
           <a:p>
             <a:fld id="{3CFB3CBB-B0CB-4DB2-9743-E80B1619C2C1}" type="datetime1">
               <a:rPr lang="en-US" smtClean="0"/>
-              <a:t>1/27/2020</a:t>
+              <a:t>1/28/2020</a:t>
             </a:fld>
             <a:endParaRPr lang="en-US" dirty="0"/>
           </a:p>
@@ -6709,135 +6906,6 @@
     <p:extLst>
       <p:ext uri="{BB962C8B-B14F-4D97-AF65-F5344CB8AC3E}">
         <p14:creationId xmlns:p14="http://schemas.microsoft.com/office/powerpoint/2010/main" val="2206750460"/>
-      </p:ext>
-    </p:extLst>
-  </p:cSld>
-  <p:clrMapOvr>
-    <a:masterClrMapping/>
-  </p:clrMapOvr>
-</p:sld>
-</file>
-
-<file path=ppt/slides/slide6.xml><?xml version="1.0" encoding="utf-8"?>
-<p:sld xmlns:a="http://schemas.openxmlformats.org/drawingml/2006/main" xmlns:r="http://schemas.openxmlformats.org/officeDocument/2006/relationships" xmlns:p="http://schemas.openxmlformats.org/presentationml/2006/main">
-  <p:cSld>
-    <p:spTree>
-      <p:nvGrpSpPr>
-        <p:cNvPr id="1" name=""/>
-        <p:cNvGrpSpPr/>
-        <p:nvPr/>
-      </p:nvGrpSpPr>
-      <p:grpSpPr>
-        <a:xfrm>
-          <a:off x="0" y="0"/>
-          <a:ext cx="0" cy="0"/>
-          <a:chOff x="0" y="0"/>
-          <a:chExt cx="0" cy="0"/>
-        </a:xfrm>
-      </p:grpSpPr>
-      <p:sp>
-        <p:nvSpPr>
-          <p:cNvPr id="2" name="Date Placeholder 1">
-            <a:extLst>
-              <a:ext uri="{FF2B5EF4-FFF2-40B4-BE49-F238E27FC236}">
-                <a16:creationId xmlns:a16="http://schemas.microsoft.com/office/drawing/2014/main" id="{CB864E48-37A9-47B1-935F-168939B5AA15}"/>
-              </a:ext>
-            </a:extLst>
-          </p:cNvPr>
-          <p:cNvSpPr>
-            <a:spLocks noGrp="1"/>
-          </p:cNvSpPr>
-          <p:nvPr>
-            <p:ph type="dt" sz="half" idx="10"/>
-          </p:nvPr>
-        </p:nvSpPr>
-        <p:spPr/>
-        <p:txBody>
-          <a:bodyPr/>
-          <a:lstStyle/>
-          <a:p>
-            <a:fld id="{D6EF5160-096B-47B6-A4A9-A8FF9261181D}" type="datetime1">
-              <a:rPr lang="en-US" smtClean="0"/>
-              <a:t>1/27/2020</a:t>
-            </a:fld>
-            <a:endParaRPr lang="en-US" dirty="0"/>
-          </a:p>
-        </p:txBody>
-      </p:sp>
-      <p:sp>
-        <p:nvSpPr>
-          <p:cNvPr id="3" name="TextBox 2">
-            <a:extLst>
-              <a:ext uri="{FF2B5EF4-FFF2-40B4-BE49-F238E27FC236}">
-                <a16:creationId xmlns:a16="http://schemas.microsoft.com/office/drawing/2014/main" id="{1890E273-70AF-4AB2-928C-D79B606322A3}"/>
-              </a:ext>
-            </a:extLst>
-          </p:cNvPr>
-          <p:cNvSpPr txBox="1"/>
-          <p:nvPr/>
-        </p:nvSpPr>
-        <p:spPr>
-          <a:xfrm>
-            <a:off x="360727" y="443012"/>
-            <a:ext cx="4093827" cy="707886"/>
-          </a:xfrm>
-          <a:prstGeom prst="rect">
-            <a:avLst/>
-          </a:prstGeom>
-          <a:noFill/>
-        </p:spPr>
-        <p:txBody>
-          <a:bodyPr wrap="square" rtlCol="0">
-            <a:spAutoFit/>
-          </a:bodyPr>
-          <a:lstStyle/>
-          <a:p>
-            <a:r>
-              <a:rPr lang="en-US" sz="4000" dirty="0"/>
-              <a:t>Test Identification</a:t>
-            </a:r>
-          </a:p>
-        </p:txBody>
-      </p:sp>
-      <p:sp>
-        <p:nvSpPr>
-          <p:cNvPr id="4" name="TextBox 3">
-            <a:extLst>
-              <a:ext uri="{FF2B5EF4-FFF2-40B4-BE49-F238E27FC236}">
-                <a16:creationId xmlns:a16="http://schemas.microsoft.com/office/drawing/2014/main" id="{E0D60709-584D-4E35-85DB-111373A28C44}"/>
-              </a:ext>
-            </a:extLst>
-          </p:cNvPr>
-          <p:cNvSpPr txBox="1"/>
-          <p:nvPr/>
-        </p:nvSpPr>
-        <p:spPr>
-          <a:xfrm>
-            <a:off x="570451" y="1295963"/>
-            <a:ext cx="2114026" cy="461665"/>
-          </a:xfrm>
-          <a:prstGeom prst="rect">
-            <a:avLst/>
-          </a:prstGeom>
-          <a:noFill/>
-        </p:spPr>
-        <p:txBody>
-          <a:bodyPr wrap="square" rtlCol="0">
-            <a:spAutoFit/>
-          </a:bodyPr>
-          <a:lstStyle/>
-          <a:p>
-            <a:r>
-              <a:rPr lang="en-US" sz="2400" dirty="0"/>
-              <a:t>Lorem Ipsum</a:t>
-            </a:r>
-          </a:p>
-        </p:txBody>
-      </p:sp>
-    </p:spTree>
-    <p:extLst>
-      <p:ext uri="{BB962C8B-B14F-4D97-AF65-F5344CB8AC3E}">
-        <p14:creationId xmlns:p14="http://schemas.microsoft.com/office/powerpoint/2010/main" val="1954735488"/>
       </p:ext>
     </p:extLst>
   </p:cSld>
@@ -6887,7 +6955,7 @@
           <a:p>
             <a:fld id="{D6EF5160-096B-47B6-A4A9-A8FF9261181D}" type="datetime1">
               <a:rPr lang="en-US" smtClean="0"/>
-              <a:t>1/27/2020</a:t>
+              <a:t>1/28/2020</a:t>
             </a:fld>
             <a:endParaRPr lang="en-US" dirty="0"/>
           </a:p>
@@ -6923,7 +6991,7 @@
           <a:p>
             <a:r>
               <a:rPr lang="en-US" sz="4000" dirty="0"/>
-              <a:t>Test Levels</a:t>
+              <a:t>Test Identification</a:t>
             </a:r>
           </a:p>
         </p:txBody>
@@ -6942,8 +7010,8 @@
         </p:nvSpPr>
         <p:spPr>
           <a:xfrm>
-            <a:off x="570451" y="1295963"/>
-            <a:ext cx="2114026" cy="461665"/>
+            <a:off x="446015" y="2459504"/>
+            <a:ext cx="11299970" cy="1938992"/>
           </a:xfrm>
           <a:prstGeom prst="rect">
             <a:avLst/>
@@ -6958,7 +7026,16 @@
           <a:p>
             <a:r>
               <a:rPr lang="en-US" sz="2400" dirty="0"/>
-              <a:t>Lorem Ipsum</a:t>
+              <a:t>The testing that will be conducted on the software will be unit testing regularly, and a weekly Integration Test done to ensure stability.</a:t>
+            </a:r>
+          </a:p>
+          <a:p>
+            <a:endParaRPr lang="en-US" sz="2400" dirty="0"/>
+          </a:p>
+          <a:p>
+            <a:r>
+              <a:rPr lang="en-US" sz="2400" dirty="0"/>
+              <a:t>We plan to design some continuous Integration testing programs to run on the process to take care of the weekly tests </a:t>
             </a:r>
           </a:p>
         </p:txBody>
@@ -6966,7 +7043,7 @@
     </p:spTree>
     <p:extLst>
       <p:ext uri="{BB962C8B-B14F-4D97-AF65-F5344CB8AC3E}">
-        <p14:creationId xmlns:p14="http://schemas.microsoft.com/office/powerpoint/2010/main" val="1491895737"/>
+        <p14:creationId xmlns:p14="http://schemas.microsoft.com/office/powerpoint/2010/main" val="1954735488"/>
       </p:ext>
     </p:extLst>
   </p:cSld>
@@ -7016,7 +7093,7 @@
           <a:p>
             <a:fld id="{D6EF5160-096B-47B6-A4A9-A8FF9261181D}" type="datetime1">
               <a:rPr lang="en-US" smtClean="0"/>
-              <a:t>1/27/2020</a:t>
+              <a:t>1/28/2020</a:t>
             </a:fld>
             <a:endParaRPr lang="en-US" dirty="0"/>
           </a:p>
@@ -7145,7 +7222,7 @@
           <a:p>
             <a:fld id="{6F70E5E6-99C0-43C8-AF23-46476C7664E8}" type="datetime1">
               <a:rPr lang="en-US" smtClean="0"/>
-              <a:t>1/27/2020</a:t>
+              <a:t>1/28/2020</a:t>
             </a:fld>
             <a:endParaRPr lang="en-US" dirty="0"/>
           </a:p>

</xml_diff>

<commit_message>
Updated the Gantt Chart to the PowerPoint
</commit_message>
<xml_diff>
--- a/Documents/Presentation 1 Team 6.pptx
+++ b/Documents/Presentation 1 Team 6.pptx
@@ -7070,6 +7070,53 @@
           <a:chExt cx="0" cy="0"/>
         </a:xfrm>
       </p:grpSpPr>
+      <p:pic>
+        <p:nvPicPr>
+          <p:cNvPr id="1031" name="Picture 7">
+            <a:extLst>
+              <a:ext uri="{FF2B5EF4-FFF2-40B4-BE49-F238E27FC236}">
+                <a16:creationId xmlns:a16="http://schemas.microsoft.com/office/drawing/2014/main" id="{BE508AA4-BB90-420A-8943-DFD017B17303}"/>
+              </a:ext>
+            </a:extLst>
+          </p:cNvPr>
+          <p:cNvPicPr>
+            <a:picLocks noChangeAspect="1" noChangeArrowheads="1"/>
+          </p:cNvPicPr>
+          <p:nvPr/>
+        </p:nvPicPr>
+        <p:blipFill>
+          <a:blip r:embed="rId2">
+            <a:extLst>
+              <a:ext uri="{28A0092B-C50C-407E-A947-70E740481C1C}">
+                <a14:useLocalDpi xmlns:a14="http://schemas.microsoft.com/office/drawing/2010/main" val="0"/>
+              </a:ext>
+            </a:extLst>
+          </a:blip>
+          <a:srcRect/>
+          <a:stretch>
+            <a:fillRect/>
+          </a:stretch>
+        </p:blipFill>
+        <p:spPr bwMode="auto">
+          <a:xfrm>
+            <a:off x="4901237" y="1245979"/>
+            <a:ext cx="7009064" cy="4846694"/>
+          </a:xfrm>
+          <a:prstGeom prst="rect">
+            <a:avLst/>
+          </a:prstGeom>
+          <a:noFill/>
+          <a:extLst>
+            <a:ext uri="{909E8E84-426E-40DD-AFC4-6F175D3DCCD1}">
+              <a14:hiddenFill xmlns:a14="http://schemas.microsoft.com/office/drawing/2010/main">
+                <a:solidFill>
+                  <a:srgbClr val="FFFFFF"/>
+                </a:solidFill>
+              </a14:hiddenFill>
+            </a:ext>
+          </a:extLst>
+        </p:spPr>
+      </p:pic>
       <p:sp>
         <p:nvSpPr>
           <p:cNvPr id="2" name="Date Placeholder 1">
@@ -7134,41 +7181,53 @@
           </a:p>
         </p:txBody>
       </p:sp>
-      <p:sp>
-        <p:nvSpPr>
-          <p:cNvPr id="4" name="TextBox 3">
+      <p:pic>
+        <p:nvPicPr>
+          <p:cNvPr id="1029" name="Picture 5">
             <a:extLst>
               <a:ext uri="{FF2B5EF4-FFF2-40B4-BE49-F238E27FC236}">
-                <a16:creationId xmlns:a16="http://schemas.microsoft.com/office/drawing/2014/main" id="{E0D60709-584D-4E35-85DB-111373A28C44}"/>
+                <a16:creationId xmlns:a16="http://schemas.microsoft.com/office/drawing/2014/main" id="{38C867BD-33B0-468C-BD12-01AB263FCC14}"/>
               </a:ext>
             </a:extLst>
           </p:cNvPr>
-          <p:cNvSpPr txBox="1"/>
+          <p:cNvPicPr>
+            <a:picLocks noChangeAspect="1" noChangeArrowheads="1"/>
+          </p:cNvPicPr>
           <p:nvPr/>
-        </p:nvSpPr>
-        <p:spPr>
+        </p:nvPicPr>
+        <p:blipFill>
+          <a:blip r:embed="rId3">
+            <a:extLst>
+              <a:ext uri="{28A0092B-C50C-407E-A947-70E740481C1C}">
+                <a14:useLocalDpi xmlns:a14="http://schemas.microsoft.com/office/drawing/2010/main" val="0"/>
+              </a:ext>
+            </a:extLst>
+          </a:blip>
+          <a:srcRect/>
+          <a:stretch>
+            <a:fillRect/>
+          </a:stretch>
+        </p:blipFill>
+        <p:spPr bwMode="auto">
           <a:xfrm>
-            <a:off x="570451" y="1295963"/>
-            <a:ext cx="2114026" cy="461665"/>
+            <a:off x="360727" y="1245979"/>
+            <a:ext cx="7009064" cy="4846694"/>
           </a:xfrm>
           <a:prstGeom prst="rect">
             <a:avLst/>
           </a:prstGeom>
           <a:noFill/>
+          <a:extLst>
+            <a:ext uri="{909E8E84-426E-40DD-AFC4-6F175D3DCCD1}">
+              <a14:hiddenFill xmlns:a14="http://schemas.microsoft.com/office/drawing/2010/main">
+                <a:solidFill>
+                  <a:srgbClr val="FFFFFF"/>
+                </a:solidFill>
+              </a14:hiddenFill>
+            </a:ext>
+          </a:extLst>
         </p:spPr>
-        <p:txBody>
-          <a:bodyPr wrap="square" rtlCol="0">
-            <a:spAutoFit/>
-          </a:bodyPr>
-          <a:lstStyle/>
-          <a:p>
-            <a:r>
-              <a:rPr lang="en-US" sz="2400" dirty="0"/>
-              <a:t>Lorem Ipsum</a:t>
-            </a:r>
-          </a:p>
-        </p:txBody>
-      </p:sp>
+      </p:pic>
     </p:spTree>
     <p:extLst>
       <p:ext uri="{BB962C8B-B14F-4D97-AF65-F5344CB8AC3E}">

</xml_diff>